<commit_message>
Make the figure of HLT-exiting virtualization overhead
modified:   design_diagram.pptx
new file:   fig/hlt_exiting_overhead.pdf
</commit_message>
<xml_diff>
--- a/haas/design_diagram.pptx
+++ b/haas/design_diagram.pptx
@@ -5,7 +5,7 @@
     <p:sldMasterId id="2147483660" r:id="rId1"/>
   </p:sldMasterIdLst>
   <p:notesMasterIdLst>
-    <p:notesMasterId r:id="rId9"/>
+    <p:notesMasterId r:id="rId10"/>
   </p:notesMasterIdLst>
   <p:sldIdLst>
     <p:sldId id="256" r:id="rId2"/>
@@ -14,7 +14,8 @@
     <p:sldId id="265" r:id="rId5"/>
     <p:sldId id="259" r:id="rId6"/>
     <p:sldId id="261" r:id="rId7"/>
-    <p:sldId id="266" r:id="rId8"/>
+    <p:sldId id="267" r:id="rId8"/>
+    <p:sldId id="266" r:id="rId9"/>
   </p:sldIdLst>
   <p:sldSz cx="12192000" cy="6858000"/>
   <p:notesSz cx="6858000" cy="9144000"/>
@@ -121,15 +122,6 @@
 </p:presentation>
 </file>
 
-<file path=ppt/revisionInfo.xml><?xml version="1.0" encoding="utf-8"?>
-<p1510:revInfo xmlns:a="http://schemas.openxmlformats.org/drawingml/2006/main" xmlns:r="http://schemas.openxmlformats.org/officeDocument/2006/relationships" xmlns:p1510="http://schemas.microsoft.com/office/powerpoint/2015/10/main">
-  <p1510:revLst>
-    <p1510:client id="{6CF46E17-00AA-7941-A6B5-FBDBADDBDA89}" v="81" dt="2018-12-31T00:23:48.875"/>
-    <p1510:client id="{7216B722-8D38-3240-8D39-CC91781C65F5}" v="207" dt="2018-12-31T20:36:31.637"/>
-  </p1510:revLst>
-</p1510:revInfo>
-</file>
-
 <file path=ppt/changesInfos/changesInfo1.xml><?xml version="1.0" encoding="utf-8"?>
 <pc:chgInfo xmlns:a="http://schemas.openxmlformats.org/drawingml/2006/main" xmlns:r="http://schemas.openxmlformats.org/officeDocument/2006/relationships" xmlns:ac="http://schemas.microsoft.com/office/drawing/2013/main/command" xmlns:pc="http://schemas.microsoft.com/office/powerpoint/2013/main/command">
   <pc:docChgLst>
@@ -3517,7 +3509,7 @@
           <a:p>
             <a:fld id="{F709D759-9C7F-7940-AAB8-FFAFB1DA9050}" type="datetimeFigureOut">
               <a:rPr lang="en-US" smtClean="0"/>
-              <a:t>12/31/18</a:t>
+              <a:t>1/19/19</a:t>
             </a:fld>
             <a:endParaRPr lang="en-US"/>
           </a:p>
@@ -3868,6 +3860,90 @@
 </p:notes>
 </file>
 
+<file path=ppt/notesSlides/notesSlide2.xml><?xml version="1.0" encoding="utf-8"?>
+<p:notes xmlns:a="http://schemas.openxmlformats.org/drawingml/2006/main" xmlns:r="http://schemas.openxmlformats.org/officeDocument/2006/relationships" xmlns:p="http://schemas.openxmlformats.org/presentationml/2006/main">
+  <p:cSld>
+    <p:spTree>
+      <p:nvGrpSpPr>
+        <p:cNvPr id="1" name=""/>
+        <p:cNvGrpSpPr/>
+        <p:nvPr/>
+      </p:nvGrpSpPr>
+      <p:grpSpPr>
+        <a:xfrm>
+          <a:off x="0" y="0"/>
+          <a:ext cx="0" cy="0"/>
+          <a:chOff x="0" y="0"/>
+          <a:chExt cx="0" cy="0"/>
+        </a:xfrm>
+      </p:grpSpPr>
+      <p:sp>
+        <p:nvSpPr>
+          <p:cNvPr id="2" name="Slide Image Placeholder 1"/>
+          <p:cNvSpPr>
+            <a:spLocks noGrp="1" noRot="1" noChangeAspect="1"/>
+          </p:cNvSpPr>
+          <p:nvPr>
+            <p:ph type="sldImg"/>
+          </p:nvPr>
+        </p:nvSpPr>
+        <p:spPr/>
+      </p:sp>
+      <p:sp>
+        <p:nvSpPr>
+          <p:cNvPr id="3" name="Notes Placeholder 2"/>
+          <p:cNvSpPr>
+            <a:spLocks noGrp="1"/>
+          </p:cNvSpPr>
+          <p:nvPr>
+            <p:ph type="body" idx="1"/>
+          </p:nvPr>
+        </p:nvSpPr>
+        <p:spPr/>
+        <p:txBody>
+          <a:bodyPr/>
+          <a:lstStyle/>
+          <a:p>
+            <a:endParaRPr lang="en-US" dirty="0"/>
+          </a:p>
+        </p:txBody>
+      </p:sp>
+      <p:sp>
+        <p:nvSpPr>
+          <p:cNvPr id="4" name="Slide Number Placeholder 3"/>
+          <p:cNvSpPr>
+            <a:spLocks noGrp="1"/>
+          </p:cNvSpPr>
+          <p:nvPr>
+            <p:ph type="sldNum" sz="quarter" idx="5"/>
+          </p:nvPr>
+        </p:nvSpPr>
+        <p:spPr/>
+        <p:txBody>
+          <a:bodyPr/>
+          <a:lstStyle/>
+          <a:p>
+            <a:fld id="{E09AB86B-F189-6845-AD3C-F130B15C649C}" type="slidenum">
+              <a:rPr lang="en-US" smtClean="0"/>
+              <a:t>7</a:t>
+            </a:fld>
+            <a:endParaRPr lang="en-US"/>
+          </a:p>
+        </p:txBody>
+      </p:sp>
+    </p:spTree>
+    <p:extLst>
+      <p:ext uri="{BB962C8B-B14F-4D97-AF65-F5344CB8AC3E}">
+        <p14:creationId xmlns:p14="http://schemas.microsoft.com/office/powerpoint/2010/main" val="2476466015"/>
+      </p:ext>
+    </p:extLst>
+  </p:cSld>
+  <p:clrMapOvr>
+    <a:masterClrMapping/>
+  </p:clrMapOvr>
+</p:notes>
+</file>
+
 <file path=ppt/slideLayouts/slideLayout1.xml><?xml version="1.0" encoding="utf-8"?>
 <p:sldLayout xmlns:a="http://schemas.openxmlformats.org/drawingml/2006/main" xmlns:r="http://schemas.openxmlformats.org/officeDocument/2006/relationships" xmlns:p="http://schemas.openxmlformats.org/presentationml/2006/main" type="title" preserve="1">
   <p:cSld name="Title Slide">
@@ -3999,7 +4075,7 @@
           <a:p>
             <a:fld id="{846CE7D5-CF57-46EF-B807-FDD0502418D4}" type="datetimeFigureOut">
               <a:rPr lang="en-US" smtClean="0"/>
-              <a:t>12/31/18</a:t>
+              <a:t>1/19/19</a:t>
             </a:fld>
             <a:endParaRPr lang="en-US"/>
           </a:p>
@@ -4169,7 +4245,7 @@
           <a:p>
             <a:fld id="{846CE7D5-CF57-46EF-B807-FDD0502418D4}" type="datetimeFigureOut">
               <a:rPr lang="en-US" smtClean="0"/>
-              <a:t>12/31/18</a:t>
+              <a:t>1/19/19</a:t>
             </a:fld>
             <a:endParaRPr lang="en-US"/>
           </a:p>
@@ -4349,7 +4425,7 @@
           <a:p>
             <a:fld id="{846CE7D5-CF57-46EF-B807-FDD0502418D4}" type="datetimeFigureOut">
               <a:rPr lang="en-US" smtClean="0"/>
-              <a:t>12/31/18</a:t>
+              <a:t>1/19/19</a:t>
             </a:fld>
             <a:endParaRPr lang="en-US"/>
           </a:p>
@@ -4519,7 +4595,7 @@
           <a:p>
             <a:fld id="{846CE7D5-CF57-46EF-B807-FDD0502418D4}" type="datetimeFigureOut">
               <a:rPr lang="en-US" smtClean="0"/>
-              <a:t>12/31/18</a:t>
+              <a:t>1/19/19</a:t>
             </a:fld>
             <a:endParaRPr lang="en-US"/>
           </a:p>
@@ -4765,7 +4841,7 @@
           <a:p>
             <a:fld id="{846CE7D5-CF57-46EF-B807-FDD0502418D4}" type="datetimeFigureOut">
               <a:rPr lang="en-US" smtClean="0"/>
-              <a:t>12/31/18</a:t>
+              <a:t>1/19/19</a:t>
             </a:fld>
             <a:endParaRPr lang="en-US"/>
           </a:p>
@@ -4997,7 +5073,7 @@
           <a:p>
             <a:fld id="{846CE7D5-CF57-46EF-B807-FDD0502418D4}" type="datetimeFigureOut">
               <a:rPr lang="en-US" smtClean="0"/>
-              <a:t>12/31/18</a:t>
+              <a:t>1/19/19</a:t>
             </a:fld>
             <a:endParaRPr lang="en-US"/>
           </a:p>
@@ -5364,7 +5440,7 @@
           <a:p>
             <a:fld id="{846CE7D5-CF57-46EF-B807-FDD0502418D4}" type="datetimeFigureOut">
               <a:rPr lang="en-US" smtClean="0"/>
-              <a:t>12/31/18</a:t>
+              <a:t>1/19/19</a:t>
             </a:fld>
             <a:endParaRPr lang="en-US"/>
           </a:p>
@@ -5482,7 +5558,7 @@
           <a:p>
             <a:fld id="{846CE7D5-CF57-46EF-B807-FDD0502418D4}" type="datetimeFigureOut">
               <a:rPr lang="en-US" smtClean="0"/>
-              <a:t>12/31/18</a:t>
+              <a:t>1/19/19</a:t>
             </a:fld>
             <a:endParaRPr lang="en-US"/>
           </a:p>
@@ -5577,7 +5653,7 @@
           <a:p>
             <a:fld id="{846CE7D5-CF57-46EF-B807-FDD0502418D4}" type="datetimeFigureOut">
               <a:rPr lang="en-US" smtClean="0"/>
-              <a:t>12/31/18</a:t>
+              <a:t>1/19/19</a:t>
             </a:fld>
             <a:endParaRPr lang="en-US"/>
           </a:p>
@@ -5854,7 +5930,7 @@
           <a:p>
             <a:fld id="{846CE7D5-CF57-46EF-B807-FDD0502418D4}" type="datetimeFigureOut">
               <a:rPr lang="en-US" smtClean="0"/>
-              <a:t>12/31/18</a:t>
+              <a:t>1/19/19</a:t>
             </a:fld>
             <a:endParaRPr lang="en-US"/>
           </a:p>
@@ -6111,7 +6187,7 @@
           <a:p>
             <a:fld id="{846CE7D5-CF57-46EF-B807-FDD0502418D4}" type="datetimeFigureOut">
               <a:rPr lang="en-US" smtClean="0"/>
-              <a:t>12/31/18</a:t>
+              <a:t>1/19/19</a:t>
             </a:fld>
             <a:endParaRPr lang="en-US"/>
           </a:p>
@@ -6324,7 +6400,7 @@
           <a:p>
             <a:fld id="{846CE7D5-CF57-46EF-B807-FDD0502418D4}" type="datetimeFigureOut">
               <a:rPr lang="en-US" smtClean="0"/>
-              <a:t>12/31/18</a:t>
+              <a:t>1/19/19</a:t>
             </a:fld>
             <a:endParaRPr lang="en-US"/>
           </a:p>
@@ -16929,6 +17005,1961 @@
 </file>
 
 <file path=ppt/slides/slide7.xml><?xml version="1.0" encoding="utf-8"?>
+<p:sld xmlns:a="http://schemas.openxmlformats.org/drawingml/2006/main" xmlns:r="http://schemas.openxmlformats.org/officeDocument/2006/relationships" xmlns:p="http://schemas.openxmlformats.org/presentationml/2006/main">
+  <p:cSld>
+    <p:spTree>
+      <p:nvGrpSpPr>
+        <p:cNvPr id="1" name=""/>
+        <p:cNvGrpSpPr/>
+        <p:nvPr/>
+      </p:nvGrpSpPr>
+      <p:grpSpPr>
+        <a:xfrm>
+          <a:off x="0" y="0"/>
+          <a:ext cx="0" cy="0"/>
+          <a:chOff x="0" y="0"/>
+          <a:chExt cx="0" cy="0"/>
+        </a:xfrm>
+      </p:grpSpPr>
+      <p:sp>
+        <p:nvSpPr>
+          <p:cNvPr id="181" name="Title 180">
+            <a:extLst>
+              <a:ext uri="{FF2B5EF4-FFF2-40B4-BE49-F238E27FC236}">
+                <a16:creationId xmlns:a16="http://schemas.microsoft.com/office/drawing/2014/main" id="{615AE5DB-645F-5646-8D43-4AE8F795E791}"/>
+              </a:ext>
+            </a:extLst>
+          </p:cNvPr>
+          <p:cNvSpPr>
+            <a:spLocks noGrp="1"/>
+          </p:cNvSpPr>
+          <p:nvPr>
+            <p:ph type="title"/>
+          </p:nvPr>
+        </p:nvSpPr>
+        <p:spPr>
+          <a:xfrm>
+            <a:off x="1836" y="3641"/>
+            <a:ext cx="4064490" cy="776640"/>
+          </a:xfrm>
+        </p:spPr>
+        <p:txBody>
+          <a:bodyPr>
+            <a:normAutofit fontScale="90000"/>
+          </a:bodyPr>
+          <a:lstStyle/>
+          <a:p>
+            <a:r>
+              <a:rPr lang="en-US" sz="3200" dirty="0"/>
+              <a:t>HLT Virtualization Overhead</a:t>
+            </a:r>
+          </a:p>
+        </p:txBody>
+      </p:sp>
+      <p:grpSp>
+        <p:nvGrpSpPr>
+          <p:cNvPr id="168" name="Group 167">
+            <a:extLst>
+              <a:ext uri="{FF2B5EF4-FFF2-40B4-BE49-F238E27FC236}">
+                <a16:creationId xmlns:a16="http://schemas.microsoft.com/office/drawing/2014/main" id="{D4345E9D-4CD5-8345-AB5C-373CC17DEF60}"/>
+              </a:ext>
+            </a:extLst>
+          </p:cNvPr>
+          <p:cNvGrpSpPr/>
+          <p:nvPr/>
+        </p:nvGrpSpPr>
+        <p:grpSpPr>
+          <a:xfrm>
+            <a:off x="627179" y="1255776"/>
+            <a:ext cx="10833301" cy="4988287"/>
+            <a:chOff x="627179" y="1255776"/>
+            <a:chExt cx="10833301" cy="4988287"/>
+          </a:xfrm>
+        </p:grpSpPr>
+        <p:sp>
+          <p:nvSpPr>
+            <p:cNvPr id="120" name="Rounded Rectangle 119">
+              <a:extLst>
+                <a:ext uri="{FF2B5EF4-FFF2-40B4-BE49-F238E27FC236}">
+                  <a16:creationId xmlns:a16="http://schemas.microsoft.com/office/drawing/2014/main" id="{25F860C6-A263-454E-B9BE-71100E82888D}"/>
+                </a:ext>
+              </a:extLst>
+            </p:cNvPr>
+            <p:cNvSpPr>
+              <a:spLocks/>
+            </p:cNvSpPr>
+            <p:nvPr/>
+          </p:nvSpPr>
+          <p:spPr>
+            <a:xfrm>
+              <a:off x="3707657" y="2243821"/>
+              <a:ext cx="1234440" cy="457200"/>
+            </a:xfrm>
+            <a:prstGeom prst="roundRect">
+              <a:avLst/>
+            </a:prstGeom>
+            <a:solidFill>
+              <a:srgbClr val="00B050"/>
+            </a:solidFill>
+            <a:ln>
+              <a:solidFill>
+                <a:schemeClr val="dk1"/>
+              </a:solidFill>
+            </a:ln>
+          </p:spPr>
+          <p:style>
+            <a:lnRef idx="2">
+              <a:schemeClr val="accent6">
+                <a:shade val="50000"/>
+              </a:schemeClr>
+            </a:lnRef>
+            <a:fillRef idx="1">
+              <a:schemeClr val="accent6"/>
+            </a:fillRef>
+            <a:effectRef idx="0">
+              <a:schemeClr val="accent6"/>
+            </a:effectRef>
+            <a:fontRef idx="minor">
+              <a:schemeClr val="lt1"/>
+            </a:fontRef>
+          </p:style>
+          <p:txBody>
+            <a:bodyPr rtlCol="0" anchor="ctr"/>
+            <a:lstStyle/>
+            <a:p>
+              <a:pPr algn="ctr"/>
+              <a:endParaRPr lang="en-US"/>
+            </a:p>
+          </p:txBody>
+        </p:sp>
+        <p:sp>
+          <p:nvSpPr>
+            <p:cNvPr id="123" name="Rounded Rectangle 122">
+              <a:extLst>
+                <a:ext uri="{FF2B5EF4-FFF2-40B4-BE49-F238E27FC236}">
+                  <a16:creationId xmlns:a16="http://schemas.microsoft.com/office/drawing/2014/main" id="{0BFB64D8-8263-EE41-AA4B-2A9FDF9845FA}"/>
+                </a:ext>
+              </a:extLst>
+            </p:cNvPr>
+            <p:cNvSpPr>
+              <a:spLocks/>
+            </p:cNvSpPr>
+            <p:nvPr/>
+          </p:nvSpPr>
+          <p:spPr>
+            <a:xfrm>
+              <a:off x="6419994" y="2243821"/>
+              <a:ext cx="320619" cy="457200"/>
+            </a:xfrm>
+            <a:prstGeom prst="roundRect">
+              <a:avLst/>
+            </a:prstGeom>
+            <a:solidFill>
+              <a:srgbClr val="00B050"/>
+            </a:solidFill>
+            <a:ln>
+              <a:solidFill>
+                <a:schemeClr val="dk1"/>
+              </a:solidFill>
+            </a:ln>
+          </p:spPr>
+          <p:style>
+            <a:lnRef idx="2">
+              <a:schemeClr val="accent6">
+                <a:shade val="50000"/>
+              </a:schemeClr>
+            </a:lnRef>
+            <a:fillRef idx="1">
+              <a:schemeClr val="accent6"/>
+            </a:fillRef>
+            <a:effectRef idx="0">
+              <a:schemeClr val="accent6"/>
+            </a:effectRef>
+            <a:fontRef idx="minor">
+              <a:schemeClr val="lt1"/>
+            </a:fontRef>
+          </p:style>
+          <p:txBody>
+            <a:bodyPr rtlCol="0" anchor="ctr"/>
+            <a:lstStyle/>
+            <a:p>
+              <a:pPr algn="ctr"/>
+              <a:endParaRPr lang="en-US" dirty="0"/>
+            </a:p>
+          </p:txBody>
+        </p:sp>
+        <p:cxnSp>
+          <p:nvCxnSpPr>
+            <p:cNvPr id="128" name="Straight Arrow Connector 127">
+              <a:extLst>
+                <a:ext uri="{FF2B5EF4-FFF2-40B4-BE49-F238E27FC236}">
+                  <a16:creationId xmlns:a16="http://schemas.microsoft.com/office/drawing/2014/main" id="{395821BA-E441-8D48-A949-55D03368B8BE}"/>
+                </a:ext>
+              </a:extLst>
+            </p:cNvPr>
+            <p:cNvCxnSpPr>
+              <a:cxnSpLocks/>
+              <a:endCxn id="179" idx="1"/>
+            </p:cNvCxnSpPr>
+            <p:nvPr/>
+          </p:nvCxnSpPr>
+          <p:spPr>
+            <a:xfrm>
+              <a:off x="627179" y="3025645"/>
+              <a:ext cx="9979947" cy="15389"/>
+            </a:xfrm>
+            <a:prstGeom prst="straightConnector1">
+              <a:avLst/>
+            </a:prstGeom>
+            <a:ln w="25400">
+              <a:tailEnd type="triangle" w="lg" len="med"/>
+            </a:ln>
+          </p:spPr>
+          <p:style>
+            <a:lnRef idx="1">
+              <a:schemeClr val="dk1"/>
+            </a:lnRef>
+            <a:fillRef idx="0">
+              <a:schemeClr val="dk1"/>
+            </a:fillRef>
+            <a:effectRef idx="0">
+              <a:schemeClr val="dk1"/>
+            </a:effectRef>
+            <a:fontRef idx="minor">
+              <a:schemeClr val="tx1"/>
+            </a:fontRef>
+          </p:style>
+        </p:cxnSp>
+        <p:sp>
+          <p:nvSpPr>
+            <p:cNvPr id="179" name="TextBox 178">
+              <a:extLst>
+                <a:ext uri="{FF2B5EF4-FFF2-40B4-BE49-F238E27FC236}">
+                  <a16:creationId xmlns:a16="http://schemas.microsoft.com/office/drawing/2014/main" id="{2BD24783-9688-B243-8B1D-00A4C7826BB7}"/>
+                </a:ext>
+              </a:extLst>
+            </p:cNvPr>
+            <p:cNvSpPr txBox="1"/>
+            <p:nvPr/>
+          </p:nvSpPr>
+          <p:spPr>
+            <a:xfrm>
+              <a:off x="10607126" y="2840979"/>
+              <a:ext cx="853354" cy="400110"/>
+            </a:xfrm>
+            <a:prstGeom prst="rect">
+              <a:avLst/>
+            </a:prstGeom>
+            <a:noFill/>
+          </p:spPr>
+          <p:txBody>
+            <a:bodyPr wrap="square" rtlCol="0">
+              <a:spAutoFit/>
+            </a:bodyPr>
+            <a:lstStyle/>
+            <a:p>
+              <a:r>
+                <a:rPr lang="en-US" sz="2000" b="1" dirty="0"/>
+                <a:t>Time</a:t>
+              </a:r>
+            </a:p>
+          </p:txBody>
+        </p:sp>
+        <p:sp>
+          <p:nvSpPr>
+            <p:cNvPr id="92" name="Rounded Rectangle 91">
+              <a:extLst>
+                <a:ext uri="{FF2B5EF4-FFF2-40B4-BE49-F238E27FC236}">
+                  <a16:creationId xmlns:a16="http://schemas.microsoft.com/office/drawing/2014/main" id="{22A7FF88-71AC-274E-9DEF-3C8E81BB20C7}"/>
+                </a:ext>
+              </a:extLst>
+            </p:cNvPr>
+            <p:cNvSpPr>
+              <a:spLocks/>
+            </p:cNvSpPr>
+            <p:nvPr/>
+          </p:nvSpPr>
+          <p:spPr>
+            <a:xfrm>
+              <a:off x="4716625" y="1398830"/>
+              <a:ext cx="3727356" cy="457200"/>
+            </a:xfrm>
+            <a:prstGeom prst="roundRect">
+              <a:avLst/>
+            </a:prstGeom>
+            <a:solidFill>
+              <a:srgbClr val="FFC000"/>
+            </a:solidFill>
+            <a:ln>
+              <a:solidFill>
+                <a:schemeClr val="dk1"/>
+              </a:solidFill>
+            </a:ln>
+          </p:spPr>
+          <p:style>
+            <a:lnRef idx="2">
+              <a:schemeClr val="accent6">
+                <a:shade val="50000"/>
+              </a:schemeClr>
+            </a:lnRef>
+            <a:fillRef idx="1">
+              <a:schemeClr val="accent6"/>
+            </a:fillRef>
+            <a:effectRef idx="0">
+              <a:schemeClr val="accent6"/>
+            </a:effectRef>
+            <a:fontRef idx="minor">
+              <a:schemeClr val="lt1"/>
+            </a:fontRef>
+          </p:style>
+          <p:txBody>
+            <a:bodyPr rtlCol="0" anchor="ctr"/>
+            <a:lstStyle/>
+            <a:p>
+              <a:pPr algn="ctr"/>
+              <a:endParaRPr lang="en-US"/>
+            </a:p>
+          </p:txBody>
+        </p:sp>
+        <p:sp>
+          <p:nvSpPr>
+            <p:cNvPr id="93" name="Rounded Rectangle 92">
+              <a:extLst>
+                <a:ext uri="{FF2B5EF4-FFF2-40B4-BE49-F238E27FC236}">
+                  <a16:creationId xmlns:a16="http://schemas.microsoft.com/office/drawing/2014/main" id="{C515CE02-9B64-B249-882D-CADCF0D12FB0}"/>
+                </a:ext>
+              </a:extLst>
+            </p:cNvPr>
+            <p:cNvSpPr>
+              <a:spLocks/>
+            </p:cNvSpPr>
+            <p:nvPr/>
+          </p:nvSpPr>
+          <p:spPr>
+            <a:xfrm>
+              <a:off x="5254752" y="3252185"/>
+              <a:ext cx="828122" cy="457200"/>
+            </a:xfrm>
+            <a:prstGeom prst="roundRect">
+              <a:avLst/>
+            </a:prstGeom>
+            <a:solidFill>
+              <a:srgbClr val="FF0000"/>
+            </a:solidFill>
+            <a:ln>
+              <a:solidFill>
+                <a:schemeClr val="dk1"/>
+              </a:solidFill>
+            </a:ln>
+          </p:spPr>
+          <p:style>
+            <a:lnRef idx="2">
+              <a:schemeClr val="accent6">
+                <a:shade val="50000"/>
+              </a:schemeClr>
+            </a:lnRef>
+            <a:fillRef idx="1">
+              <a:schemeClr val="accent6"/>
+            </a:fillRef>
+            <a:effectRef idx="0">
+              <a:schemeClr val="accent6"/>
+            </a:effectRef>
+            <a:fontRef idx="minor">
+              <a:schemeClr val="lt1"/>
+            </a:fontRef>
+          </p:style>
+          <p:txBody>
+            <a:bodyPr rtlCol="0" anchor="ctr"/>
+            <a:lstStyle/>
+            <a:p>
+              <a:pPr algn="ctr"/>
+              <a:endParaRPr lang="en-US"/>
+            </a:p>
+          </p:txBody>
+        </p:sp>
+        <p:cxnSp>
+          <p:nvCxnSpPr>
+            <p:cNvPr id="109" name="Straight Arrow Connector 108">
+              <a:extLst>
+                <a:ext uri="{FF2B5EF4-FFF2-40B4-BE49-F238E27FC236}">
+                  <a16:creationId xmlns:a16="http://schemas.microsoft.com/office/drawing/2014/main" id="{D69EEDBC-39B9-E64F-8D53-37FBDFC92722}"/>
+                </a:ext>
+              </a:extLst>
+            </p:cNvPr>
+            <p:cNvCxnSpPr>
+              <a:cxnSpLocks/>
+              <a:stCxn id="120" idx="0"/>
+              <a:endCxn id="92" idx="1"/>
+            </p:cNvCxnSpPr>
+            <p:nvPr/>
+          </p:nvCxnSpPr>
+          <p:spPr>
+            <a:xfrm flipV="1">
+              <a:off x="4324877" y="1627430"/>
+              <a:ext cx="391748" cy="616391"/>
+            </a:xfrm>
+            <a:prstGeom prst="straightConnector1">
+              <a:avLst/>
+            </a:prstGeom>
+            <a:ln w="25400">
+              <a:headEnd type="oval" w="med" len="med"/>
+              <a:tailEnd type="triangle" w="lg" len="med"/>
+            </a:ln>
+          </p:spPr>
+          <p:style>
+            <a:lnRef idx="1">
+              <a:schemeClr val="dk1"/>
+            </a:lnRef>
+            <a:fillRef idx="0">
+              <a:schemeClr val="dk1"/>
+            </a:fillRef>
+            <a:effectRef idx="0">
+              <a:schemeClr val="dk1"/>
+            </a:effectRef>
+            <a:fontRef idx="minor">
+              <a:schemeClr val="tx1"/>
+            </a:fontRef>
+          </p:style>
+        </p:cxnSp>
+        <p:cxnSp>
+          <p:nvCxnSpPr>
+            <p:cNvPr id="111" name="Straight Arrow Connector 110">
+              <a:extLst>
+                <a:ext uri="{FF2B5EF4-FFF2-40B4-BE49-F238E27FC236}">
+                  <a16:creationId xmlns:a16="http://schemas.microsoft.com/office/drawing/2014/main" id="{4AB2E0BC-5BEC-074E-977E-DD311943E7D3}"/>
+                </a:ext>
+              </a:extLst>
+            </p:cNvPr>
+            <p:cNvCxnSpPr>
+              <a:cxnSpLocks/>
+              <a:stCxn id="93" idx="3"/>
+              <a:endCxn id="123" idx="1"/>
+            </p:cNvCxnSpPr>
+            <p:nvPr/>
+          </p:nvCxnSpPr>
+          <p:spPr>
+            <a:xfrm flipV="1">
+              <a:off x="6082874" y="2472421"/>
+              <a:ext cx="337120" cy="1008364"/>
+            </a:xfrm>
+            <a:prstGeom prst="straightConnector1">
+              <a:avLst/>
+            </a:prstGeom>
+            <a:ln w="25400">
+              <a:headEnd type="oval" w="med" len="med"/>
+              <a:tailEnd type="triangle" w="lg" len="med"/>
+            </a:ln>
+          </p:spPr>
+          <p:style>
+            <a:lnRef idx="1">
+              <a:schemeClr val="dk1"/>
+            </a:lnRef>
+            <a:fillRef idx="0">
+              <a:schemeClr val="dk1"/>
+            </a:fillRef>
+            <a:effectRef idx="0">
+              <a:schemeClr val="dk1"/>
+            </a:effectRef>
+            <a:fontRef idx="minor">
+              <a:schemeClr val="tx1"/>
+            </a:fontRef>
+          </p:style>
+        </p:cxnSp>
+        <p:cxnSp>
+          <p:nvCxnSpPr>
+            <p:cNvPr id="119" name="Straight Arrow Connector 118">
+              <a:extLst>
+                <a:ext uri="{FF2B5EF4-FFF2-40B4-BE49-F238E27FC236}">
+                  <a16:creationId xmlns:a16="http://schemas.microsoft.com/office/drawing/2014/main" id="{9D3AE6B4-493B-564F-9ECB-BCFB2241843B}"/>
+                </a:ext>
+              </a:extLst>
+            </p:cNvPr>
+            <p:cNvCxnSpPr>
+              <a:cxnSpLocks/>
+              <a:stCxn id="120" idx="3"/>
+              <a:endCxn id="93" idx="1"/>
+            </p:cNvCxnSpPr>
+            <p:nvPr/>
+          </p:nvCxnSpPr>
+          <p:spPr>
+            <a:xfrm>
+              <a:off x="4942097" y="2472421"/>
+              <a:ext cx="312655" cy="1008364"/>
+            </a:xfrm>
+            <a:prstGeom prst="straightConnector1">
+              <a:avLst/>
+            </a:prstGeom>
+            <a:ln w="25400">
+              <a:headEnd type="oval" w="med" len="med"/>
+              <a:tailEnd type="triangle" w="lg" len="med"/>
+            </a:ln>
+          </p:spPr>
+          <p:style>
+            <a:lnRef idx="1">
+              <a:schemeClr val="dk1"/>
+            </a:lnRef>
+            <a:fillRef idx="0">
+              <a:schemeClr val="dk1"/>
+            </a:fillRef>
+            <a:effectRef idx="0">
+              <a:schemeClr val="dk1"/>
+            </a:effectRef>
+            <a:fontRef idx="minor">
+              <a:schemeClr val="tx1"/>
+            </a:fontRef>
+          </p:style>
+        </p:cxnSp>
+        <p:sp>
+          <p:nvSpPr>
+            <p:cNvPr id="130" name="Rounded Rectangle 129">
+              <a:extLst>
+                <a:ext uri="{FF2B5EF4-FFF2-40B4-BE49-F238E27FC236}">
+                  <a16:creationId xmlns:a16="http://schemas.microsoft.com/office/drawing/2014/main" id="{C4B510F4-7577-6640-8612-6FBE06B08E58}"/>
+                </a:ext>
+              </a:extLst>
+            </p:cNvPr>
+            <p:cNvSpPr>
+              <a:spLocks/>
+            </p:cNvSpPr>
+            <p:nvPr/>
+          </p:nvSpPr>
+          <p:spPr>
+            <a:xfrm>
+              <a:off x="8181005" y="2243821"/>
+              <a:ext cx="834270" cy="457200"/>
+            </a:xfrm>
+            <a:prstGeom prst="roundRect">
+              <a:avLst/>
+            </a:prstGeom>
+            <a:solidFill>
+              <a:srgbClr val="00B050"/>
+            </a:solidFill>
+            <a:ln>
+              <a:solidFill>
+                <a:schemeClr val="dk1"/>
+              </a:solidFill>
+            </a:ln>
+          </p:spPr>
+          <p:style>
+            <a:lnRef idx="2">
+              <a:schemeClr val="accent6">
+                <a:shade val="50000"/>
+              </a:schemeClr>
+            </a:lnRef>
+            <a:fillRef idx="1">
+              <a:schemeClr val="accent6"/>
+            </a:fillRef>
+            <a:effectRef idx="0">
+              <a:schemeClr val="accent6"/>
+            </a:effectRef>
+            <a:fontRef idx="minor">
+              <a:schemeClr val="lt1"/>
+            </a:fontRef>
+          </p:style>
+          <p:txBody>
+            <a:bodyPr rtlCol="0" anchor="ctr"/>
+            <a:lstStyle/>
+            <a:p>
+              <a:pPr algn="ctr"/>
+              <a:endParaRPr lang="en-US" dirty="0"/>
+            </a:p>
+          </p:txBody>
+        </p:sp>
+        <p:sp>
+          <p:nvSpPr>
+            <p:cNvPr id="134" name="Rounded Rectangle 133">
+              <a:extLst>
+                <a:ext uri="{FF2B5EF4-FFF2-40B4-BE49-F238E27FC236}">
+                  <a16:creationId xmlns:a16="http://schemas.microsoft.com/office/drawing/2014/main" id="{AAA89C41-D9E0-6243-AA07-32E69677D3DB}"/>
+                </a:ext>
+              </a:extLst>
+            </p:cNvPr>
+            <p:cNvSpPr>
+              <a:spLocks/>
+            </p:cNvSpPr>
+            <p:nvPr/>
+          </p:nvSpPr>
+          <p:spPr>
+            <a:xfrm>
+              <a:off x="7049206" y="3252185"/>
+              <a:ext cx="828122" cy="457200"/>
+            </a:xfrm>
+            <a:prstGeom prst="roundRect">
+              <a:avLst/>
+            </a:prstGeom>
+            <a:solidFill>
+              <a:srgbClr val="FF0000"/>
+            </a:solidFill>
+            <a:ln>
+              <a:solidFill>
+                <a:schemeClr val="dk1"/>
+              </a:solidFill>
+            </a:ln>
+          </p:spPr>
+          <p:style>
+            <a:lnRef idx="2">
+              <a:schemeClr val="accent6">
+                <a:shade val="50000"/>
+              </a:schemeClr>
+            </a:lnRef>
+            <a:fillRef idx="1">
+              <a:schemeClr val="accent6"/>
+            </a:fillRef>
+            <a:effectRef idx="0">
+              <a:schemeClr val="accent6"/>
+            </a:effectRef>
+            <a:fontRef idx="minor">
+              <a:schemeClr val="lt1"/>
+            </a:fontRef>
+          </p:style>
+          <p:txBody>
+            <a:bodyPr rtlCol="0" anchor="ctr"/>
+            <a:lstStyle/>
+            <a:p>
+              <a:pPr algn="ctr"/>
+              <a:endParaRPr lang="en-US"/>
+            </a:p>
+          </p:txBody>
+        </p:sp>
+        <p:cxnSp>
+          <p:nvCxnSpPr>
+            <p:cNvPr id="135" name="Straight Arrow Connector 134">
+              <a:extLst>
+                <a:ext uri="{FF2B5EF4-FFF2-40B4-BE49-F238E27FC236}">
+                  <a16:creationId xmlns:a16="http://schemas.microsoft.com/office/drawing/2014/main" id="{ABA4AB89-66C5-124D-A06A-A37B62FA8107}"/>
+                </a:ext>
+              </a:extLst>
+            </p:cNvPr>
+            <p:cNvCxnSpPr>
+              <a:cxnSpLocks/>
+              <a:stCxn id="123" idx="3"/>
+              <a:endCxn id="134" idx="1"/>
+            </p:cNvCxnSpPr>
+            <p:nvPr/>
+          </p:nvCxnSpPr>
+          <p:spPr>
+            <a:xfrm>
+              <a:off x="6740613" y="2472421"/>
+              <a:ext cx="308593" cy="1008364"/>
+            </a:xfrm>
+            <a:prstGeom prst="straightConnector1">
+              <a:avLst/>
+            </a:prstGeom>
+            <a:ln w="25400">
+              <a:headEnd type="oval" w="med" len="med"/>
+              <a:tailEnd type="triangle" w="lg" len="med"/>
+            </a:ln>
+          </p:spPr>
+          <p:style>
+            <a:lnRef idx="1">
+              <a:schemeClr val="dk1"/>
+            </a:lnRef>
+            <a:fillRef idx="0">
+              <a:schemeClr val="dk1"/>
+            </a:fillRef>
+            <a:effectRef idx="0">
+              <a:schemeClr val="dk1"/>
+            </a:effectRef>
+            <a:fontRef idx="minor">
+              <a:schemeClr val="tx1"/>
+            </a:fontRef>
+          </p:style>
+        </p:cxnSp>
+        <p:cxnSp>
+          <p:nvCxnSpPr>
+            <p:cNvPr id="138" name="Straight Arrow Connector 137">
+              <a:extLst>
+                <a:ext uri="{FF2B5EF4-FFF2-40B4-BE49-F238E27FC236}">
+                  <a16:creationId xmlns:a16="http://schemas.microsoft.com/office/drawing/2014/main" id="{82E4393B-4335-A94F-B5C5-4A9F95FE3D76}"/>
+                </a:ext>
+              </a:extLst>
+            </p:cNvPr>
+            <p:cNvCxnSpPr>
+              <a:cxnSpLocks/>
+              <a:stCxn id="134" idx="3"/>
+              <a:endCxn id="130" idx="1"/>
+            </p:cNvCxnSpPr>
+            <p:nvPr/>
+          </p:nvCxnSpPr>
+          <p:spPr>
+            <a:xfrm flipV="1">
+              <a:off x="7877328" y="2472421"/>
+              <a:ext cx="303677" cy="1008364"/>
+            </a:xfrm>
+            <a:prstGeom prst="straightConnector1">
+              <a:avLst/>
+            </a:prstGeom>
+            <a:ln w="25400">
+              <a:headEnd type="oval" w="med" len="med"/>
+              <a:tailEnd type="triangle" w="lg" len="med"/>
+            </a:ln>
+          </p:spPr>
+          <p:style>
+            <a:lnRef idx="1">
+              <a:schemeClr val="dk1"/>
+            </a:lnRef>
+            <a:fillRef idx="0">
+              <a:schemeClr val="dk1"/>
+            </a:fillRef>
+            <a:effectRef idx="0">
+              <a:schemeClr val="dk1"/>
+            </a:effectRef>
+            <a:fontRef idx="minor">
+              <a:schemeClr val="tx1"/>
+            </a:fontRef>
+          </p:style>
+        </p:cxnSp>
+        <p:cxnSp>
+          <p:nvCxnSpPr>
+            <p:cNvPr id="87" name="Straight Connector 86">
+              <a:extLst>
+                <a:ext uri="{FF2B5EF4-FFF2-40B4-BE49-F238E27FC236}">
+                  <a16:creationId xmlns:a16="http://schemas.microsoft.com/office/drawing/2014/main" id="{315834C2-AAE8-4B41-A17C-EE462676E36F}"/>
+                </a:ext>
+              </a:extLst>
+            </p:cNvPr>
+            <p:cNvCxnSpPr/>
+            <p:nvPr/>
+          </p:nvCxnSpPr>
+          <p:spPr>
+            <a:xfrm>
+              <a:off x="2133600" y="1255776"/>
+              <a:ext cx="0" cy="2584704"/>
+            </a:xfrm>
+            <a:prstGeom prst="line">
+              <a:avLst/>
+            </a:prstGeom>
+          </p:spPr>
+          <p:style>
+            <a:lnRef idx="3">
+              <a:schemeClr val="dk1"/>
+            </a:lnRef>
+            <a:fillRef idx="0">
+              <a:schemeClr val="dk1"/>
+            </a:fillRef>
+            <a:effectRef idx="2">
+              <a:schemeClr val="dk1"/>
+            </a:effectRef>
+            <a:fontRef idx="minor">
+              <a:schemeClr val="tx1"/>
+            </a:fontRef>
+          </p:style>
+        </p:cxnSp>
+        <p:cxnSp>
+          <p:nvCxnSpPr>
+            <p:cNvPr id="97" name="Straight Connector 96">
+              <a:extLst>
+                <a:ext uri="{FF2B5EF4-FFF2-40B4-BE49-F238E27FC236}">
+                  <a16:creationId xmlns:a16="http://schemas.microsoft.com/office/drawing/2014/main" id="{B943E248-5D48-2244-8AAF-08211367C921}"/>
+                </a:ext>
+              </a:extLst>
+            </p:cNvPr>
+            <p:cNvCxnSpPr>
+              <a:cxnSpLocks/>
+            </p:cNvCxnSpPr>
+            <p:nvPr/>
+          </p:nvCxnSpPr>
+          <p:spPr>
+            <a:xfrm>
+              <a:off x="2133600" y="2011680"/>
+              <a:ext cx="8388096" cy="0"/>
+            </a:xfrm>
+            <a:prstGeom prst="line">
+              <a:avLst/>
+            </a:prstGeom>
+            <a:ln>
+              <a:prstDash val="dash"/>
+            </a:ln>
+          </p:spPr>
+          <p:style>
+            <a:lnRef idx="3">
+              <a:schemeClr val="dk1"/>
+            </a:lnRef>
+            <a:fillRef idx="0">
+              <a:schemeClr val="dk1"/>
+            </a:fillRef>
+            <a:effectRef idx="2">
+              <a:schemeClr val="dk1"/>
+            </a:effectRef>
+            <a:fontRef idx="minor">
+              <a:schemeClr val="tx1"/>
+            </a:fontRef>
+          </p:style>
+        </p:cxnSp>
+        <p:sp>
+          <p:nvSpPr>
+            <p:cNvPr id="98" name="TextBox 97">
+              <a:extLst>
+                <a:ext uri="{FF2B5EF4-FFF2-40B4-BE49-F238E27FC236}">
+                  <a16:creationId xmlns:a16="http://schemas.microsoft.com/office/drawing/2014/main" id="{4B1F4592-88DF-4746-89F5-4AC72ECE8288}"/>
+                </a:ext>
+              </a:extLst>
+            </p:cNvPr>
+            <p:cNvSpPr txBox="1"/>
+            <p:nvPr/>
+          </p:nvSpPr>
+          <p:spPr>
+            <a:xfrm>
+              <a:off x="627179" y="1750070"/>
+              <a:ext cx="1469931" cy="523220"/>
+            </a:xfrm>
+            <a:prstGeom prst="rect">
+              <a:avLst/>
+            </a:prstGeom>
+            <a:noFill/>
+          </p:spPr>
+          <p:txBody>
+            <a:bodyPr wrap="square" rtlCol="0">
+              <a:spAutoFit/>
+            </a:bodyPr>
+            <a:lstStyle/>
+            <a:p>
+              <a:r>
+                <a:rPr lang="en-US" sz="2800" dirty="0"/>
+                <a:t>GUEST</a:t>
+              </a:r>
+            </a:p>
+          </p:txBody>
+        </p:sp>
+        <p:sp>
+          <p:nvSpPr>
+            <p:cNvPr id="161" name="TextBox 160">
+              <a:extLst>
+                <a:ext uri="{FF2B5EF4-FFF2-40B4-BE49-F238E27FC236}">
+                  <a16:creationId xmlns:a16="http://schemas.microsoft.com/office/drawing/2014/main" id="{DA5B365F-63C2-1147-B6E0-A117D1C65902}"/>
+                </a:ext>
+              </a:extLst>
+            </p:cNvPr>
+            <p:cNvSpPr txBox="1"/>
+            <p:nvPr/>
+          </p:nvSpPr>
+          <p:spPr>
+            <a:xfrm>
+              <a:off x="679349" y="3219175"/>
+              <a:ext cx="1365590" cy="523220"/>
+            </a:xfrm>
+            <a:prstGeom prst="rect">
+              <a:avLst/>
+            </a:prstGeom>
+            <a:noFill/>
+          </p:spPr>
+          <p:txBody>
+            <a:bodyPr wrap="square" rtlCol="0">
+              <a:spAutoFit/>
+            </a:bodyPr>
+            <a:lstStyle/>
+            <a:p>
+              <a:r>
+                <a:rPr lang="en-US" sz="2800" dirty="0"/>
+                <a:t>HOST</a:t>
+              </a:r>
+            </a:p>
+          </p:txBody>
+        </p:sp>
+        <p:sp>
+          <p:nvSpPr>
+            <p:cNvPr id="162" name="TextBox 161">
+              <a:extLst>
+                <a:ext uri="{FF2B5EF4-FFF2-40B4-BE49-F238E27FC236}">
+                  <a16:creationId xmlns:a16="http://schemas.microsoft.com/office/drawing/2014/main" id="{6B3DD707-A4EA-F645-83A4-93EEAC37989D}"/>
+                </a:ext>
+              </a:extLst>
+            </p:cNvPr>
+            <p:cNvSpPr txBox="1"/>
+            <p:nvPr/>
+          </p:nvSpPr>
+          <p:spPr>
+            <a:xfrm>
+              <a:off x="2262514" y="1365820"/>
+              <a:ext cx="999352" cy="523220"/>
+            </a:xfrm>
+            <a:prstGeom prst="rect">
+              <a:avLst/>
+            </a:prstGeom>
+            <a:noFill/>
+          </p:spPr>
+          <p:txBody>
+            <a:bodyPr wrap="square" rtlCol="0">
+              <a:spAutoFit/>
+            </a:bodyPr>
+            <a:lstStyle/>
+            <a:p>
+              <a:r>
+                <a:rPr lang="en-US" sz="2800" dirty="0"/>
+                <a:t>I/O</a:t>
+              </a:r>
+            </a:p>
+          </p:txBody>
+        </p:sp>
+        <p:sp>
+          <p:nvSpPr>
+            <p:cNvPr id="163" name="TextBox 162">
+              <a:extLst>
+                <a:ext uri="{FF2B5EF4-FFF2-40B4-BE49-F238E27FC236}">
+                  <a16:creationId xmlns:a16="http://schemas.microsoft.com/office/drawing/2014/main" id="{29DD991B-F170-B14B-A281-158D8F6F5F90}"/>
+                </a:ext>
+              </a:extLst>
+            </p:cNvPr>
+            <p:cNvSpPr txBox="1"/>
+            <p:nvPr/>
+          </p:nvSpPr>
+          <p:spPr>
+            <a:xfrm>
+              <a:off x="2262514" y="2210811"/>
+              <a:ext cx="999352" cy="523220"/>
+            </a:xfrm>
+            <a:prstGeom prst="rect">
+              <a:avLst/>
+            </a:prstGeom>
+            <a:noFill/>
+          </p:spPr>
+          <p:txBody>
+            <a:bodyPr wrap="square" rtlCol="0">
+              <a:spAutoFit/>
+            </a:bodyPr>
+            <a:lstStyle/>
+            <a:p>
+              <a:r>
+                <a:rPr lang="en-US" sz="2800" dirty="0"/>
+                <a:t>CPU</a:t>
+              </a:r>
+            </a:p>
+          </p:txBody>
+        </p:sp>
+        <p:sp>
+          <p:nvSpPr>
+            <p:cNvPr id="164" name="TextBox 163">
+              <a:extLst>
+                <a:ext uri="{FF2B5EF4-FFF2-40B4-BE49-F238E27FC236}">
+                  <a16:creationId xmlns:a16="http://schemas.microsoft.com/office/drawing/2014/main" id="{12FB7F55-D21E-094C-80C6-BC7FB2460762}"/>
+                </a:ext>
+              </a:extLst>
+            </p:cNvPr>
+            <p:cNvSpPr txBox="1"/>
+            <p:nvPr/>
+          </p:nvSpPr>
+          <p:spPr>
+            <a:xfrm>
+              <a:off x="2262514" y="3219175"/>
+              <a:ext cx="999352" cy="523220"/>
+            </a:xfrm>
+            <a:prstGeom prst="rect">
+              <a:avLst/>
+            </a:prstGeom>
+            <a:noFill/>
+          </p:spPr>
+          <p:txBody>
+            <a:bodyPr wrap="square" rtlCol="0">
+              <a:spAutoFit/>
+            </a:bodyPr>
+            <a:lstStyle/>
+            <a:p>
+              <a:r>
+                <a:rPr lang="en-US" sz="2800" dirty="0"/>
+                <a:t>CPU</a:t>
+              </a:r>
+            </a:p>
+          </p:txBody>
+        </p:sp>
+        <p:sp>
+          <p:nvSpPr>
+            <p:cNvPr id="165" name="TextBox 164">
+              <a:extLst>
+                <a:ext uri="{FF2B5EF4-FFF2-40B4-BE49-F238E27FC236}">
+                  <a16:creationId xmlns:a16="http://schemas.microsoft.com/office/drawing/2014/main" id="{070BEC20-F5A2-F049-BA7D-9D647AF7B82A}"/>
+                </a:ext>
+              </a:extLst>
+            </p:cNvPr>
+            <p:cNvSpPr txBox="1"/>
+            <p:nvPr/>
+          </p:nvSpPr>
+          <p:spPr>
+            <a:xfrm>
+              <a:off x="3683197" y="1557679"/>
+              <a:ext cx="937729" cy="400110"/>
+            </a:xfrm>
+            <a:prstGeom prst="rect">
+              <a:avLst/>
+            </a:prstGeom>
+            <a:noFill/>
+          </p:spPr>
+          <p:txBody>
+            <a:bodyPr wrap="square" rtlCol="0">
+              <a:spAutoFit/>
+            </a:bodyPr>
+            <a:lstStyle/>
+            <a:p>
+              <a:r>
+                <a:rPr lang="en-US" sz="2000" b="1" dirty="0"/>
+                <a:t>MMIO</a:t>
+              </a:r>
+            </a:p>
+          </p:txBody>
+        </p:sp>
+        <p:sp>
+          <p:nvSpPr>
+            <p:cNvPr id="166" name="TextBox 165">
+              <a:extLst>
+                <a:ext uri="{FF2B5EF4-FFF2-40B4-BE49-F238E27FC236}">
+                  <a16:creationId xmlns:a16="http://schemas.microsoft.com/office/drawing/2014/main" id="{D063DC83-0803-AF43-861F-1EDF7E068FEF}"/>
+                </a:ext>
+              </a:extLst>
+            </p:cNvPr>
+            <p:cNvSpPr txBox="1"/>
+            <p:nvPr/>
+          </p:nvSpPr>
+          <p:spPr>
+            <a:xfrm>
+              <a:off x="8626506" y="1557679"/>
+              <a:ext cx="651745" cy="400110"/>
+            </a:xfrm>
+            <a:prstGeom prst="rect">
+              <a:avLst/>
+            </a:prstGeom>
+            <a:noFill/>
+          </p:spPr>
+          <p:txBody>
+            <a:bodyPr wrap="square" rtlCol="0">
+              <a:spAutoFit/>
+            </a:bodyPr>
+            <a:lstStyle/>
+            <a:p>
+              <a:r>
+                <a:rPr lang="en-US" sz="2000" b="1" dirty="0"/>
+                <a:t>IRQ</a:t>
+              </a:r>
+            </a:p>
+          </p:txBody>
+        </p:sp>
+        <p:sp>
+          <p:nvSpPr>
+            <p:cNvPr id="167" name="TextBox 166">
+              <a:extLst>
+                <a:ext uri="{FF2B5EF4-FFF2-40B4-BE49-F238E27FC236}">
+                  <a16:creationId xmlns:a16="http://schemas.microsoft.com/office/drawing/2014/main" id="{1D1997FF-2B32-B548-BA73-06B96534E64C}"/>
+                </a:ext>
+              </a:extLst>
+            </p:cNvPr>
+            <p:cNvSpPr txBox="1"/>
+            <p:nvPr/>
+          </p:nvSpPr>
+          <p:spPr>
+            <a:xfrm>
+              <a:off x="9089092" y="2541020"/>
+              <a:ext cx="648670" cy="400110"/>
+            </a:xfrm>
+            <a:prstGeom prst="rect">
+              <a:avLst/>
+            </a:prstGeom>
+            <a:noFill/>
+          </p:spPr>
+          <p:txBody>
+            <a:bodyPr wrap="square" rtlCol="0">
+              <a:spAutoFit/>
+            </a:bodyPr>
+            <a:lstStyle/>
+            <a:p>
+              <a:r>
+                <a:rPr lang="en-US" sz="2000" b="1" dirty="0"/>
+                <a:t>EOI</a:t>
+              </a:r>
+            </a:p>
+          </p:txBody>
+        </p:sp>
+        <p:cxnSp>
+          <p:nvCxnSpPr>
+            <p:cNvPr id="105" name="Straight Arrow Connector 104">
+              <a:extLst>
+                <a:ext uri="{FF2B5EF4-FFF2-40B4-BE49-F238E27FC236}">
+                  <a16:creationId xmlns:a16="http://schemas.microsoft.com/office/drawing/2014/main" id="{344D966A-FE1C-A042-B190-09106A4DACBC}"/>
+                </a:ext>
+              </a:extLst>
+            </p:cNvPr>
+            <p:cNvCxnSpPr>
+              <a:cxnSpLocks/>
+              <a:stCxn id="92" idx="3"/>
+              <a:endCxn id="130" idx="3"/>
+            </p:cNvCxnSpPr>
+            <p:nvPr/>
+          </p:nvCxnSpPr>
+          <p:spPr>
+            <a:xfrm>
+              <a:off x="8443981" y="1627430"/>
+              <a:ext cx="571294" cy="844991"/>
+            </a:xfrm>
+            <a:prstGeom prst="straightConnector1">
+              <a:avLst/>
+            </a:prstGeom>
+            <a:ln w="25400">
+              <a:headEnd type="oval" w="med" len="med"/>
+              <a:tailEnd type="triangle" w="lg" len="med"/>
+            </a:ln>
+          </p:spPr>
+          <p:style>
+            <a:lnRef idx="1">
+              <a:schemeClr val="dk1"/>
+            </a:lnRef>
+            <a:fillRef idx="0">
+              <a:schemeClr val="dk1"/>
+            </a:fillRef>
+            <a:effectRef idx="0">
+              <a:schemeClr val="dk1"/>
+            </a:effectRef>
+            <a:fontRef idx="minor">
+              <a:schemeClr val="tx1"/>
+            </a:fontRef>
+          </p:style>
+        </p:cxnSp>
+        <p:sp>
+          <p:nvSpPr>
+            <p:cNvPr id="174" name="Rounded Rectangle 173">
+              <a:extLst>
+                <a:ext uri="{FF2B5EF4-FFF2-40B4-BE49-F238E27FC236}">
+                  <a16:creationId xmlns:a16="http://schemas.microsoft.com/office/drawing/2014/main" id="{E6EF0CC0-D15B-D144-921E-6E46285DFF1F}"/>
+                </a:ext>
+              </a:extLst>
+            </p:cNvPr>
+            <p:cNvSpPr>
+              <a:spLocks/>
+            </p:cNvSpPr>
+            <p:nvPr/>
+          </p:nvSpPr>
+          <p:spPr>
+            <a:xfrm>
+              <a:off x="9724063" y="2243821"/>
+              <a:ext cx="320619" cy="457200"/>
+            </a:xfrm>
+            <a:prstGeom prst="roundRect">
+              <a:avLst/>
+            </a:prstGeom>
+            <a:solidFill>
+              <a:srgbClr val="00B050"/>
+            </a:solidFill>
+            <a:ln>
+              <a:solidFill>
+                <a:schemeClr val="dk1"/>
+              </a:solidFill>
+            </a:ln>
+          </p:spPr>
+          <p:style>
+            <a:lnRef idx="2">
+              <a:schemeClr val="accent6">
+                <a:shade val="50000"/>
+              </a:schemeClr>
+            </a:lnRef>
+            <a:fillRef idx="1">
+              <a:schemeClr val="accent6"/>
+            </a:fillRef>
+            <a:effectRef idx="0">
+              <a:schemeClr val="accent6"/>
+            </a:effectRef>
+            <a:fontRef idx="minor">
+              <a:schemeClr val="lt1"/>
+            </a:fontRef>
+          </p:style>
+          <p:txBody>
+            <a:bodyPr rtlCol="0" anchor="ctr"/>
+            <a:lstStyle/>
+            <a:p>
+              <a:pPr algn="ctr"/>
+              <a:endParaRPr lang="en-US" dirty="0"/>
+            </a:p>
+          </p:txBody>
+        </p:sp>
+        <p:cxnSp>
+          <p:nvCxnSpPr>
+            <p:cNvPr id="175" name="Straight Arrow Connector 174">
+              <a:extLst>
+                <a:ext uri="{FF2B5EF4-FFF2-40B4-BE49-F238E27FC236}">
+                  <a16:creationId xmlns:a16="http://schemas.microsoft.com/office/drawing/2014/main" id="{DE4D5F86-B5EB-914A-88AC-10216F2B3755}"/>
+                </a:ext>
+              </a:extLst>
+            </p:cNvPr>
+            <p:cNvCxnSpPr>
+              <a:cxnSpLocks/>
+              <a:stCxn id="130" idx="3"/>
+              <a:endCxn id="174" idx="1"/>
+            </p:cNvCxnSpPr>
+            <p:nvPr/>
+          </p:nvCxnSpPr>
+          <p:spPr>
+            <a:xfrm>
+              <a:off x="9015275" y="2472421"/>
+              <a:ext cx="708788" cy="0"/>
+            </a:xfrm>
+            <a:prstGeom prst="straightConnector1">
+              <a:avLst/>
+            </a:prstGeom>
+            <a:ln w="25400">
+              <a:headEnd type="oval" w="med" len="med"/>
+              <a:tailEnd type="triangle" w="lg" len="med"/>
+            </a:ln>
+          </p:spPr>
+          <p:style>
+            <a:lnRef idx="1">
+              <a:schemeClr val="dk1"/>
+            </a:lnRef>
+            <a:fillRef idx="0">
+              <a:schemeClr val="dk1"/>
+            </a:fillRef>
+            <a:effectRef idx="0">
+              <a:schemeClr val="dk1"/>
+            </a:effectRef>
+            <a:fontRef idx="minor">
+              <a:schemeClr val="tx1"/>
+            </a:fontRef>
+          </p:style>
+        </p:cxnSp>
+        <p:sp>
+          <p:nvSpPr>
+            <p:cNvPr id="176" name="TextBox 175">
+              <a:extLst>
+                <a:ext uri="{FF2B5EF4-FFF2-40B4-BE49-F238E27FC236}">
+                  <a16:creationId xmlns:a16="http://schemas.microsoft.com/office/drawing/2014/main" id="{3DB354E5-D6B8-9448-AE31-CAED3D95D961}"/>
+                </a:ext>
+              </a:extLst>
+            </p:cNvPr>
+            <p:cNvSpPr txBox="1"/>
+            <p:nvPr/>
+          </p:nvSpPr>
+          <p:spPr>
+            <a:xfrm>
+              <a:off x="5053896" y="2541020"/>
+              <a:ext cx="708359" cy="400110"/>
+            </a:xfrm>
+            <a:prstGeom prst="rect">
+              <a:avLst/>
+            </a:prstGeom>
+            <a:noFill/>
+          </p:spPr>
+          <p:txBody>
+            <a:bodyPr wrap="square" rtlCol="0">
+              <a:spAutoFit/>
+            </a:bodyPr>
+            <a:lstStyle/>
+            <a:p>
+              <a:r>
+                <a:rPr lang="en-US" sz="2000" b="1" dirty="0"/>
+                <a:t>HLT</a:t>
+              </a:r>
+            </a:p>
+          </p:txBody>
+        </p:sp>
+        <p:sp>
+          <p:nvSpPr>
+            <p:cNvPr id="182" name="TextBox 181">
+              <a:extLst>
+                <a:ext uri="{FF2B5EF4-FFF2-40B4-BE49-F238E27FC236}">
+                  <a16:creationId xmlns:a16="http://schemas.microsoft.com/office/drawing/2014/main" id="{176A3FF4-8F9D-884B-9F6A-DFDC0FAB3161}"/>
+                </a:ext>
+              </a:extLst>
+            </p:cNvPr>
+            <p:cNvSpPr txBox="1"/>
+            <p:nvPr/>
+          </p:nvSpPr>
+          <p:spPr>
+            <a:xfrm>
+              <a:off x="6897175" y="2541020"/>
+              <a:ext cx="688061" cy="400110"/>
+            </a:xfrm>
+            <a:prstGeom prst="rect">
+              <a:avLst/>
+            </a:prstGeom>
+            <a:noFill/>
+          </p:spPr>
+          <p:txBody>
+            <a:bodyPr wrap="square" rtlCol="0">
+              <a:spAutoFit/>
+            </a:bodyPr>
+            <a:lstStyle/>
+            <a:p>
+              <a:r>
+                <a:rPr lang="en-US" sz="2000" b="1" dirty="0"/>
+                <a:t>HLT</a:t>
+              </a:r>
+            </a:p>
+          </p:txBody>
+        </p:sp>
+        <p:sp>
+          <p:nvSpPr>
+            <p:cNvPr id="184" name="Rounded Rectangle 183">
+              <a:extLst>
+                <a:ext uri="{FF2B5EF4-FFF2-40B4-BE49-F238E27FC236}">
+                  <a16:creationId xmlns:a16="http://schemas.microsoft.com/office/drawing/2014/main" id="{571FEAEA-D0AD-2B47-8FE3-AE42F436BD71}"/>
+                </a:ext>
+              </a:extLst>
+            </p:cNvPr>
+            <p:cNvSpPr>
+              <a:spLocks/>
+            </p:cNvSpPr>
+            <p:nvPr/>
+          </p:nvSpPr>
+          <p:spPr>
+            <a:xfrm>
+              <a:off x="3707657" y="5246795"/>
+              <a:ext cx="5307618" cy="457200"/>
+            </a:xfrm>
+            <a:prstGeom prst="roundRect">
+              <a:avLst/>
+            </a:prstGeom>
+            <a:solidFill>
+              <a:srgbClr val="00B050"/>
+            </a:solidFill>
+            <a:ln>
+              <a:solidFill>
+                <a:schemeClr val="dk1"/>
+              </a:solidFill>
+            </a:ln>
+          </p:spPr>
+          <p:style>
+            <a:lnRef idx="2">
+              <a:schemeClr val="accent6">
+                <a:shade val="50000"/>
+              </a:schemeClr>
+            </a:lnRef>
+            <a:fillRef idx="1">
+              <a:schemeClr val="accent6"/>
+            </a:fillRef>
+            <a:effectRef idx="0">
+              <a:schemeClr val="accent6"/>
+            </a:effectRef>
+            <a:fontRef idx="minor">
+              <a:schemeClr val="lt1"/>
+            </a:fontRef>
+          </p:style>
+          <p:txBody>
+            <a:bodyPr rtlCol="0" anchor="ctr"/>
+            <a:lstStyle/>
+            <a:p>
+              <a:pPr algn="ctr"/>
+              <a:endParaRPr lang="en-US"/>
+            </a:p>
+          </p:txBody>
+        </p:sp>
+        <p:cxnSp>
+          <p:nvCxnSpPr>
+            <p:cNvPr id="188" name="Straight Arrow Connector 187">
+              <a:extLst>
+                <a:ext uri="{FF2B5EF4-FFF2-40B4-BE49-F238E27FC236}">
+                  <a16:creationId xmlns:a16="http://schemas.microsoft.com/office/drawing/2014/main" id="{B0F95296-C00D-DB42-B830-CE6869FB7A42}"/>
+                </a:ext>
+              </a:extLst>
+            </p:cNvPr>
+            <p:cNvCxnSpPr>
+              <a:cxnSpLocks/>
+              <a:endCxn id="189" idx="1"/>
+            </p:cNvCxnSpPr>
+            <p:nvPr/>
+          </p:nvCxnSpPr>
+          <p:spPr>
+            <a:xfrm>
+              <a:off x="727677" y="6044008"/>
+              <a:ext cx="9879449" cy="0"/>
+            </a:xfrm>
+            <a:prstGeom prst="straightConnector1">
+              <a:avLst/>
+            </a:prstGeom>
+            <a:ln w="25400">
+              <a:tailEnd type="triangle" w="lg" len="med"/>
+            </a:ln>
+          </p:spPr>
+          <p:style>
+            <a:lnRef idx="1">
+              <a:schemeClr val="dk1"/>
+            </a:lnRef>
+            <a:fillRef idx="0">
+              <a:schemeClr val="dk1"/>
+            </a:fillRef>
+            <a:effectRef idx="0">
+              <a:schemeClr val="dk1"/>
+            </a:effectRef>
+            <a:fontRef idx="minor">
+              <a:schemeClr val="tx1"/>
+            </a:fontRef>
+          </p:style>
+        </p:cxnSp>
+        <p:sp>
+          <p:nvSpPr>
+            <p:cNvPr id="189" name="TextBox 188">
+              <a:extLst>
+                <a:ext uri="{FF2B5EF4-FFF2-40B4-BE49-F238E27FC236}">
+                  <a16:creationId xmlns:a16="http://schemas.microsoft.com/office/drawing/2014/main" id="{BAD121A8-2271-F246-8AFE-9EFBD49E7B79}"/>
+                </a:ext>
+              </a:extLst>
+            </p:cNvPr>
+            <p:cNvSpPr txBox="1"/>
+            <p:nvPr/>
+          </p:nvSpPr>
+          <p:spPr>
+            <a:xfrm>
+              <a:off x="10607126" y="5843953"/>
+              <a:ext cx="853354" cy="400110"/>
+            </a:xfrm>
+            <a:prstGeom prst="rect">
+              <a:avLst/>
+            </a:prstGeom>
+            <a:noFill/>
+          </p:spPr>
+          <p:txBody>
+            <a:bodyPr wrap="square" rtlCol="0">
+              <a:spAutoFit/>
+            </a:bodyPr>
+            <a:lstStyle/>
+            <a:p>
+              <a:r>
+                <a:rPr lang="en-US" sz="2000" b="1" dirty="0"/>
+                <a:t>Time</a:t>
+              </a:r>
+            </a:p>
+          </p:txBody>
+        </p:sp>
+        <p:sp>
+          <p:nvSpPr>
+            <p:cNvPr id="190" name="Rounded Rectangle 189">
+              <a:extLst>
+                <a:ext uri="{FF2B5EF4-FFF2-40B4-BE49-F238E27FC236}">
+                  <a16:creationId xmlns:a16="http://schemas.microsoft.com/office/drawing/2014/main" id="{5799BD5F-1C01-C74C-A44A-6406A73FF2FD}"/>
+                </a:ext>
+              </a:extLst>
+            </p:cNvPr>
+            <p:cNvSpPr>
+              <a:spLocks/>
+            </p:cNvSpPr>
+            <p:nvPr/>
+          </p:nvSpPr>
+          <p:spPr>
+            <a:xfrm>
+              <a:off x="4716625" y="4401804"/>
+              <a:ext cx="3727356" cy="457200"/>
+            </a:xfrm>
+            <a:prstGeom prst="roundRect">
+              <a:avLst/>
+            </a:prstGeom>
+            <a:solidFill>
+              <a:srgbClr val="FFC000"/>
+            </a:solidFill>
+            <a:ln>
+              <a:solidFill>
+                <a:schemeClr val="dk1"/>
+              </a:solidFill>
+            </a:ln>
+          </p:spPr>
+          <p:style>
+            <a:lnRef idx="2">
+              <a:schemeClr val="accent6">
+                <a:shade val="50000"/>
+              </a:schemeClr>
+            </a:lnRef>
+            <a:fillRef idx="1">
+              <a:schemeClr val="accent6"/>
+            </a:fillRef>
+            <a:effectRef idx="0">
+              <a:schemeClr val="accent6"/>
+            </a:effectRef>
+            <a:fontRef idx="minor">
+              <a:schemeClr val="lt1"/>
+            </a:fontRef>
+          </p:style>
+          <p:txBody>
+            <a:bodyPr rtlCol="0" anchor="ctr"/>
+            <a:lstStyle/>
+            <a:p>
+              <a:pPr algn="ctr"/>
+              <a:endParaRPr lang="en-US"/>
+            </a:p>
+          </p:txBody>
+        </p:sp>
+        <p:cxnSp>
+          <p:nvCxnSpPr>
+            <p:cNvPr id="194" name="Straight Arrow Connector 193">
+              <a:extLst>
+                <a:ext uri="{FF2B5EF4-FFF2-40B4-BE49-F238E27FC236}">
+                  <a16:creationId xmlns:a16="http://schemas.microsoft.com/office/drawing/2014/main" id="{C8BAD2F4-A729-B14C-A934-31192258B97E}"/>
+                </a:ext>
+              </a:extLst>
+            </p:cNvPr>
+            <p:cNvCxnSpPr>
+              <a:cxnSpLocks/>
+              <a:endCxn id="190" idx="1"/>
+            </p:cNvCxnSpPr>
+            <p:nvPr/>
+          </p:nvCxnSpPr>
+          <p:spPr>
+            <a:xfrm flipV="1">
+              <a:off x="4324877" y="4630404"/>
+              <a:ext cx="391748" cy="645860"/>
+            </a:xfrm>
+            <a:prstGeom prst="straightConnector1">
+              <a:avLst/>
+            </a:prstGeom>
+            <a:ln w="25400">
+              <a:headEnd type="oval" w="med" len="med"/>
+              <a:tailEnd type="triangle" w="lg" len="med"/>
+            </a:ln>
+          </p:spPr>
+          <p:style>
+            <a:lnRef idx="1">
+              <a:schemeClr val="dk1"/>
+            </a:lnRef>
+            <a:fillRef idx="0">
+              <a:schemeClr val="dk1"/>
+            </a:fillRef>
+            <a:effectRef idx="0">
+              <a:schemeClr val="dk1"/>
+            </a:effectRef>
+            <a:fontRef idx="minor">
+              <a:schemeClr val="tx1"/>
+            </a:fontRef>
+          </p:style>
+        </p:cxnSp>
+        <p:cxnSp>
+          <p:nvCxnSpPr>
+            <p:cNvPr id="207" name="Straight Connector 206">
+              <a:extLst>
+                <a:ext uri="{FF2B5EF4-FFF2-40B4-BE49-F238E27FC236}">
+                  <a16:creationId xmlns:a16="http://schemas.microsoft.com/office/drawing/2014/main" id="{68EADB7E-33DB-6A46-A860-5D79555270F0}"/>
+                </a:ext>
+              </a:extLst>
+            </p:cNvPr>
+            <p:cNvCxnSpPr>
+              <a:cxnSpLocks/>
+            </p:cNvCxnSpPr>
+            <p:nvPr/>
+          </p:nvCxnSpPr>
+          <p:spPr>
+            <a:xfrm>
+              <a:off x="2133600" y="4258750"/>
+              <a:ext cx="0" cy="1769869"/>
+            </a:xfrm>
+            <a:prstGeom prst="line">
+              <a:avLst/>
+            </a:prstGeom>
+          </p:spPr>
+          <p:style>
+            <a:lnRef idx="3">
+              <a:schemeClr val="dk1"/>
+            </a:lnRef>
+            <a:fillRef idx="0">
+              <a:schemeClr val="dk1"/>
+            </a:fillRef>
+            <a:effectRef idx="2">
+              <a:schemeClr val="dk1"/>
+            </a:effectRef>
+            <a:fontRef idx="minor">
+              <a:schemeClr val="tx1"/>
+            </a:fontRef>
+          </p:style>
+        </p:cxnSp>
+        <p:cxnSp>
+          <p:nvCxnSpPr>
+            <p:cNvPr id="208" name="Straight Connector 207">
+              <a:extLst>
+                <a:ext uri="{FF2B5EF4-FFF2-40B4-BE49-F238E27FC236}">
+                  <a16:creationId xmlns:a16="http://schemas.microsoft.com/office/drawing/2014/main" id="{D5DD3E41-3D50-F842-9509-EC97694BE413}"/>
+                </a:ext>
+              </a:extLst>
+            </p:cNvPr>
+            <p:cNvCxnSpPr>
+              <a:cxnSpLocks/>
+            </p:cNvCxnSpPr>
+            <p:nvPr/>
+          </p:nvCxnSpPr>
+          <p:spPr>
+            <a:xfrm>
+              <a:off x="2133600" y="5014654"/>
+              <a:ext cx="8388096" cy="0"/>
+            </a:xfrm>
+            <a:prstGeom prst="line">
+              <a:avLst/>
+            </a:prstGeom>
+            <a:ln>
+              <a:prstDash val="dash"/>
+            </a:ln>
+          </p:spPr>
+          <p:style>
+            <a:lnRef idx="3">
+              <a:schemeClr val="dk1"/>
+            </a:lnRef>
+            <a:fillRef idx="0">
+              <a:schemeClr val="dk1"/>
+            </a:fillRef>
+            <a:effectRef idx="2">
+              <a:schemeClr val="dk1"/>
+            </a:effectRef>
+            <a:fontRef idx="minor">
+              <a:schemeClr val="tx1"/>
+            </a:fontRef>
+          </p:style>
+        </p:cxnSp>
+        <p:sp>
+          <p:nvSpPr>
+            <p:cNvPr id="209" name="TextBox 208">
+              <a:extLst>
+                <a:ext uri="{FF2B5EF4-FFF2-40B4-BE49-F238E27FC236}">
+                  <a16:creationId xmlns:a16="http://schemas.microsoft.com/office/drawing/2014/main" id="{3CBC259F-F5D7-BE40-A00B-0B4CC9EF578D}"/>
+                </a:ext>
+              </a:extLst>
+            </p:cNvPr>
+            <p:cNvSpPr txBox="1"/>
+            <p:nvPr/>
+          </p:nvSpPr>
+          <p:spPr>
+            <a:xfrm>
+              <a:off x="627179" y="4753044"/>
+              <a:ext cx="1469931" cy="523220"/>
+            </a:xfrm>
+            <a:prstGeom prst="rect">
+              <a:avLst/>
+            </a:prstGeom>
+            <a:noFill/>
+          </p:spPr>
+          <p:txBody>
+            <a:bodyPr wrap="square" rtlCol="0">
+              <a:spAutoFit/>
+            </a:bodyPr>
+            <a:lstStyle/>
+            <a:p>
+              <a:r>
+                <a:rPr lang="en-US" sz="2800" dirty="0"/>
+                <a:t>GUEST</a:t>
+              </a:r>
+            </a:p>
+          </p:txBody>
+        </p:sp>
+        <p:sp>
+          <p:nvSpPr>
+            <p:cNvPr id="212" name="TextBox 211">
+              <a:extLst>
+                <a:ext uri="{FF2B5EF4-FFF2-40B4-BE49-F238E27FC236}">
+                  <a16:creationId xmlns:a16="http://schemas.microsoft.com/office/drawing/2014/main" id="{69BF754A-2183-1143-B040-5ADC764474E8}"/>
+                </a:ext>
+              </a:extLst>
+            </p:cNvPr>
+            <p:cNvSpPr txBox="1"/>
+            <p:nvPr/>
+          </p:nvSpPr>
+          <p:spPr>
+            <a:xfrm>
+              <a:off x="2262514" y="4368794"/>
+              <a:ext cx="999352" cy="523220"/>
+            </a:xfrm>
+            <a:prstGeom prst="rect">
+              <a:avLst/>
+            </a:prstGeom>
+            <a:noFill/>
+          </p:spPr>
+          <p:txBody>
+            <a:bodyPr wrap="square" rtlCol="0">
+              <a:spAutoFit/>
+            </a:bodyPr>
+            <a:lstStyle/>
+            <a:p>
+              <a:r>
+                <a:rPr lang="en-US" sz="2800" dirty="0"/>
+                <a:t>I/O</a:t>
+              </a:r>
+            </a:p>
+          </p:txBody>
+        </p:sp>
+        <p:sp>
+          <p:nvSpPr>
+            <p:cNvPr id="213" name="TextBox 212">
+              <a:extLst>
+                <a:ext uri="{FF2B5EF4-FFF2-40B4-BE49-F238E27FC236}">
+                  <a16:creationId xmlns:a16="http://schemas.microsoft.com/office/drawing/2014/main" id="{CE75E9F2-7595-9947-B551-457CA00B8C1F}"/>
+                </a:ext>
+              </a:extLst>
+            </p:cNvPr>
+            <p:cNvSpPr txBox="1"/>
+            <p:nvPr/>
+          </p:nvSpPr>
+          <p:spPr>
+            <a:xfrm>
+              <a:off x="2262514" y="5213785"/>
+              <a:ext cx="999352" cy="523220"/>
+            </a:xfrm>
+            <a:prstGeom prst="rect">
+              <a:avLst/>
+            </a:prstGeom>
+            <a:noFill/>
+          </p:spPr>
+          <p:txBody>
+            <a:bodyPr wrap="square" rtlCol="0">
+              <a:spAutoFit/>
+            </a:bodyPr>
+            <a:lstStyle/>
+            <a:p>
+              <a:r>
+                <a:rPr lang="en-US" sz="2800" dirty="0"/>
+                <a:t>CPU</a:t>
+              </a:r>
+            </a:p>
+          </p:txBody>
+        </p:sp>
+        <p:sp>
+          <p:nvSpPr>
+            <p:cNvPr id="215" name="TextBox 214">
+              <a:extLst>
+                <a:ext uri="{FF2B5EF4-FFF2-40B4-BE49-F238E27FC236}">
+                  <a16:creationId xmlns:a16="http://schemas.microsoft.com/office/drawing/2014/main" id="{9A35BDAC-A99E-6243-90F9-6005026879E0}"/>
+                </a:ext>
+              </a:extLst>
+            </p:cNvPr>
+            <p:cNvSpPr txBox="1"/>
+            <p:nvPr/>
+          </p:nvSpPr>
+          <p:spPr>
+            <a:xfrm>
+              <a:off x="3683197" y="4560653"/>
+              <a:ext cx="937729" cy="400110"/>
+            </a:xfrm>
+            <a:prstGeom prst="rect">
+              <a:avLst/>
+            </a:prstGeom>
+            <a:noFill/>
+          </p:spPr>
+          <p:txBody>
+            <a:bodyPr wrap="square" rtlCol="0">
+              <a:spAutoFit/>
+            </a:bodyPr>
+            <a:lstStyle/>
+            <a:p>
+              <a:r>
+                <a:rPr lang="en-US" sz="2000" b="1" dirty="0"/>
+                <a:t>MMIO</a:t>
+              </a:r>
+            </a:p>
+          </p:txBody>
+        </p:sp>
+        <p:sp>
+          <p:nvSpPr>
+            <p:cNvPr id="216" name="TextBox 215">
+              <a:extLst>
+                <a:ext uri="{FF2B5EF4-FFF2-40B4-BE49-F238E27FC236}">
+                  <a16:creationId xmlns:a16="http://schemas.microsoft.com/office/drawing/2014/main" id="{6406F1C3-26CD-6E42-BE0A-6E276F691984}"/>
+                </a:ext>
+              </a:extLst>
+            </p:cNvPr>
+            <p:cNvSpPr txBox="1"/>
+            <p:nvPr/>
+          </p:nvSpPr>
+          <p:spPr>
+            <a:xfrm>
+              <a:off x="8626506" y="4560653"/>
+              <a:ext cx="651745" cy="400110"/>
+            </a:xfrm>
+            <a:prstGeom prst="rect">
+              <a:avLst/>
+            </a:prstGeom>
+            <a:noFill/>
+          </p:spPr>
+          <p:txBody>
+            <a:bodyPr wrap="square" rtlCol="0">
+              <a:spAutoFit/>
+            </a:bodyPr>
+            <a:lstStyle/>
+            <a:p>
+              <a:r>
+                <a:rPr lang="en-US" sz="2000" b="1" dirty="0"/>
+                <a:t>IRQ</a:t>
+              </a:r>
+            </a:p>
+          </p:txBody>
+        </p:sp>
+        <p:sp>
+          <p:nvSpPr>
+            <p:cNvPr id="217" name="TextBox 216">
+              <a:extLst>
+                <a:ext uri="{FF2B5EF4-FFF2-40B4-BE49-F238E27FC236}">
+                  <a16:creationId xmlns:a16="http://schemas.microsoft.com/office/drawing/2014/main" id="{61445383-EFA2-0B43-AA3F-EF062E793791}"/>
+                </a:ext>
+              </a:extLst>
+            </p:cNvPr>
+            <p:cNvSpPr txBox="1"/>
+            <p:nvPr/>
+          </p:nvSpPr>
+          <p:spPr>
+            <a:xfrm>
+              <a:off x="9089092" y="5543994"/>
+              <a:ext cx="648670" cy="400110"/>
+            </a:xfrm>
+            <a:prstGeom prst="rect">
+              <a:avLst/>
+            </a:prstGeom>
+            <a:noFill/>
+          </p:spPr>
+          <p:txBody>
+            <a:bodyPr wrap="square" rtlCol="0">
+              <a:spAutoFit/>
+            </a:bodyPr>
+            <a:lstStyle/>
+            <a:p>
+              <a:r>
+                <a:rPr lang="en-US" sz="2000" b="1" dirty="0"/>
+                <a:t>EOI</a:t>
+              </a:r>
+            </a:p>
+          </p:txBody>
+        </p:sp>
+        <p:cxnSp>
+          <p:nvCxnSpPr>
+            <p:cNvPr id="218" name="Straight Arrow Connector 217">
+              <a:extLst>
+                <a:ext uri="{FF2B5EF4-FFF2-40B4-BE49-F238E27FC236}">
+                  <a16:creationId xmlns:a16="http://schemas.microsoft.com/office/drawing/2014/main" id="{FD92622B-AD92-7148-A617-2ACBA018E65D}"/>
+                </a:ext>
+              </a:extLst>
+            </p:cNvPr>
+            <p:cNvCxnSpPr>
+              <a:cxnSpLocks/>
+              <a:stCxn id="190" idx="3"/>
+              <a:endCxn id="184" idx="3"/>
+            </p:cNvCxnSpPr>
+            <p:nvPr/>
+          </p:nvCxnSpPr>
+          <p:spPr>
+            <a:xfrm>
+              <a:off x="8443981" y="4630404"/>
+              <a:ext cx="571294" cy="844991"/>
+            </a:xfrm>
+            <a:prstGeom prst="straightConnector1">
+              <a:avLst/>
+            </a:prstGeom>
+            <a:ln w="25400">
+              <a:headEnd type="oval" w="med" len="med"/>
+              <a:tailEnd type="triangle" w="lg" len="med"/>
+            </a:ln>
+          </p:spPr>
+          <p:style>
+            <a:lnRef idx="1">
+              <a:schemeClr val="dk1"/>
+            </a:lnRef>
+            <a:fillRef idx="0">
+              <a:schemeClr val="dk1"/>
+            </a:fillRef>
+            <a:effectRef idx="0">
+              <a:schemeClr val="dk1"/>
+            </a:effectRef>
+            <a:fontRef idx="minor">
+              <a:schemeClr val="tx1"/>
+            </a:fontRef>
+          </p:style>
+        </p:cxnSp>
+        <p:sp>
+          <p:nvSpPr>
+            <p:cNvPr id="219" name="Rounded Rectangle 218">
+              <a:extLst>
+                <a:ext uri="{FF2B5EF4-FFF2-40B4-BE49-F238E27FC236}">
+                  <a16:creationId xmlns:a16="http://schemas.microsoft.com/office/drawing/2014/main" id="{6E5E20DE-C7A7-E047-B3FB-3618D8E9D615}"/>
+                </a:ext>
+              </a:extLst>
+            </p:cNvPr>
+            <p:cNvSpPr>
+              <a:spLocks/>
+            </p:cNvSpPr>
+            <p:nvPr/>
+          </p:nvSpPr>
+          <p:spPr>
+            <a:xfrm>
+              <a:off x="9724063" y="5246795"/>
+              <a:ext cx="320619" cy="457200"/>
+            </a:xfrm>
+            <a:prstGeom prst="roundRect">
+              <a:avLst/>
+            </a:prstGeom>
+            <a:solidFill>
+              <a:srgbClr val="00B050"/>
+            </a:solidFill>
+            <a:ln>
+              <a:solidFill>
+                <a:schemeClr val="dk1"/>
+              </a:solidFill>
+            </a:ln>
+          </p:spPr>
+          <p:style>
+            <a:lnRef idx="2">
+              <a:schemeClr val="accent6">
+                <a:shade val="50000"/>
+              </a:schemeClr>
+            </a:lnRef>
+            <a:fillRef idx="1">
+              <a:schemeClr val="accent6"/>
+            </a:fillRef>
+            <a:effectRef idx="0">
+              <a:schemeClr val="accent6"/>
+            </a:effectRef>
+            <a:fontRef idx="minor">
+              <a:schemeClr val="lt1"/>
+            </a:fontRef>
+          </p:style>
+          <p:txBody>
+            <a:bodyPr rtlCol="0" anchor="ctr"/>
+            <a:lstStyle/>
+            <a:p>
+              <a:pPr algn="ctr"/>
+              <a:endParaRPr lang="en-US" dirty="0"/>
+            </a:p>
+          </p:txBody>
+        </p:sp>
+        <p:cxnSp>
+          <p:nvCxnSpPr>
+            <p:cNvPr id="220" name="Straight Arrow Connector 219">
+              <a:extLst>
+                <a:ext uri="{FF2B5EF4-FFF2-40B4-BE49-F238E27FC236}">
+                  <a16:creationId xmlns:a16="http://schemas.microsoft.com/office/drawing/2014/main" id="{518FCC44-BCBE-FB46-83D8-72532EFD6EC9}"/>
+                </a:ext>
+              </a:extLst>
+            </p:cNvPr>
+            <p:cNvCxnSpPr>
+              <a:cxnSpLocks/>
+              <a:stCxn id="184" idx="3"/>
+              <a:endCxn id="219" idx="1"/>
+            </p:cNvCxnSpPr>
+            <p:nvPr/>
+          </p:nvCxnSpPr>
+          <p:spPr>
+            <a:xfrm>
+              <a:off x="9015275" y="5475395"/>
+              <a:ext cx="708788" cy="0"/>
+            </a:xfrm>
+            <a:prstGeom prst="straightConnector1">
+              <a:avLst/>
+            </a:prstGeom>
+            <a:ln w="25400">
+              <a:headEnd type="oval" w="med" len="med"/>
+              <a:tailEnd type="triangle" w="lg" len="med"/>
+            </a:ln>
+          </p:spPr>
+          <p:style>
+            <a:lnRef idx="1">
+              <a:schemeClr val="dk1"/>
+            </a:lnRef>
+            <a:fillRef idx="0">
+              <a:schemeClr val="dk1"/>
+            </a:fillRef>
+            <a:effectRef idx="0">
+              <a:schemeClr val="dk1"/>
+            </a:effectRef>
+            <a:fontRef idx="minor">
+              <a:schemeClr val="tx1"/>
+            </a:fontRef>
+          </p:style>
+        </p:cxnSp>
+      </p:grpSp>
+    </p:spTree>
+    <p:extLst>
+      <p:ext uri="{BB962C8B-B14F-4D97-AF65-F5344CB8AC3E}">
+        <p14:creationId xmlns:p14="http://schemas.microsoft.com/office/powerpoint/2010/main" val="1095085412"/>
+      </p:ext>
+    </p:extLst>
+  </p:cSld>
+  <p:clrMapOvr>
+    <a:masterClrMapping/>
+  </p:clrMapOvr>
+</p:sld>
+</file>
+
+<file path=ppt/slides/slide8.xml><?xml version="1.0" encoding="utf-8"?>
 <p:sld xmlns:a="http://schemas.openxmlformats.org/drawingml/2006/main" xmlns:r="http://schemas.openxmlformats.org/officeDocument/2006/relationships" xmlns:p="http://schemas.openxmlformats.org/presentationml/2006/main">
   <p:cSld>
     <p:spTree>

</xml_diff>